<commit_message>
Move buttons to the bottom in List activity and improve display
</commit_message>
<xml_diff>
--- a/0_Présentation - IP-Locator.pptx
+++ b/0_Présentation - IP-Locator.pptx
@@ -10,10 +10,10 @@
     <p:sldId id="265" r:id="rId4"/>
     <p:sldId id="259" r:id="rId5"/>
     <p:sldId id="257" r:id="rId6"/>
-    <p:sldId id="258" r:id="rId7"/>
-    <p:sldId id="266" r:id="rId8"/>
-    <p:sldId id="262" r:id="rId9"/>
-    <p:sldId id="264" r:id="rId10"/>
+    <p:sldId id="267" r:id="rId7"/>
+    <p:sldId id="258" r:id="rId8"/>
+    <p:sldId id="266" r:id="rId9"/>
+    <p:sldId id="262" r:id="rId10"/>
   </p:sldIdLst>
   <p:sldSz cx="12192000" cy="6858000"/>
   <p:notesSz cx="6858000" cy="9144000"/>
@@ -634,7 +634,7 @@
           <a:p>
             <a:fld id="{48A87A34-81AB-432B-8DAE-1953F412C126}" type="datetimeFigureOut">
               <a:rPr lang="en-US" smtClean="0"/>
-              <a:t>12/17/2020</a:t>
+              <a:t>1/5/2021</a:t>
             </a:fld>
             <a:endParaRPr lang="en-US" dirty="0"/>
           </a:p>
@@ -931,7 +931,7 @@
             <a:fld id="{48A87A34-81AB-432B-8DAE-1953F412C126}" type="datetimeFigureOut">
               <a:rPr lang="en-US" smtClean="0"/>
               <a:pPr/>
-              <a:t>12/17/2020</a:t>
+              <a:t>1/5/2021</a:t>
             </a:fld>
             <a:endParaRPr lang="en-US" dirty="0"/>
           </a:p>
@@ -1181,7 +1181,7 @@
             <a:fld id="{48A87A34-81AB-432B-8DAE-1953F412C126}" type="datetimeFigureOut">
               <a:rPr lang="en-US" smtClean="0"/>
               <a:pPr/>
-              <a:t>12/17/2020</a:t>
+              <a:t>1/5/2021</a:t>
             </a:fld>
             <a:endParaRPr lang="en-US" dirty="0"/>
           </a:p>
@@ -1723,7 +1723,7 @@
             <a:fld id="{48A87A34-81AB-432B-8DAE-1953F412C126}" type="datetimeFigureOut">
               <a:rPr lang="en-US" smtClean="0"/>
               <a:pPr/>
-              <a:t>12/17/2020</a:t>
+              <a:t>1/5/2021</a:t>
             </a:fld>
             <a:endParaRPr lang="en-US" dirty="0"/>
           </a:p>
@@ -1973,7 +1973,7 @@
             <a:fld id="{48A87A34-81AB-432B-8DAE-1953F412C126}" type="datetimeFigureOut">
               <a:rPr lang="en-US" smtClean="0"/>
               <a:pPr/>
-              <a:t>12/17/2020</a:t>
+              <a:t>1/5/2021</a:t>
             </a:fld>
             <a:endParaRPr lang="en-US" dirty="0"/>
           </a:p>
@@ -2507,7 +2507,7 @@
             <a:fld id="{48A87A34-81AB-432B-8DAE-1953F412C126}" type="datetimeFigureOut">
               <a:rPr lang="en-US" smtClean="0"/>
               <a:pPr/>
-              <a:t>12/17/2020</a:t>
+              <a:t>1/5/2021</a:t>
             </a:fld>
             <a:endParaRPr lang="en-US" dirty="0"/>
           </a:p>
@@ -2806,7 +2806,7 @@
             <a:fld id="{48A87A34-81AB-432B-8DAE-1953F412C126}" type="datetimeFigureOut">
               <a:rPr lang="en-US" smtClean="0"/>
               <a:pPr/>
-              <a:t>12/17/2020</a:t>
+              <a:t>1/5/2021</a:t>
             </a:fld>
             <a:endParaRPr lang="en-US" dirty="0"/>
           </a:p>
@@ -2981,7 +2981,7 @@
           <a:p>
             <a:fld id="{48A87A34-81AB-432B-8DAE-1953F412C126}" type="datetimeFigureOut">
               <a:rPr lang="en-US" smtClean="0"/>
-              <a:t>12/17/2020</a:t>
+              <a:t>1/5/2021</a:t>
             </a:fld>
             <a:endParaRPr lang="en-US" dirty="0"/>
           </a:p>
@@ -3161,7 +3161,7 @@
           <a:p>
             <a:fld id="{48A87A34-81AB-432B-8DAE-1953F412C126}" type="datetimeFigureOut">
               <a:rPr lang="en-US" smtClean="0"/>
-              <a:t>12/17/2020</a:t>
+              <a:t>1/5/2021</a:t>
             </a:fld>
             <a:endParaRPr lang="en-US" dirty="0"/>
           </a:p>
@@ -3372,7 +3372,7 @@
           <a:p>
             <a:fld id="{48A87A34-81AB-432B-8DAE-1953F412C126}" type="datetimeFigureOut">
               <a:rPr lang="en-US" smtClean="0"/>
-              <a:t>12/17/2020</a:t>
+              <a:t>1/5/2021</a:t>
             </a:fld>
             <a:endParaRPr lang="en-US" dirty="0"/>
           </a:p>
@@ -3623,7 +3623,7 @@
           <a:p>
             <a:fld id="{48A87A34-81AB-432B-8DAE-1953F412C126}" type="datetimeFigureOut">
               <a:rPr lang="en-US" smtClean="0"/>
-              <a:t>12/17/2020</a:t>
+              <a:t>1/5/2021</a:t>
             </a:fld>
             <a:endParaRPr lang="en-US" dirty="0"/>
           </a:p>
@@ -3970,7 +3970,7 @@
           <a:p>
             <a:fld id="{48A87A34-81AB-432B-8DAE-1953F412C126}" type="datetimeFigureOut">
               <a:rPr lang="en-US" smtClean="0"/>
-              <a:t>12/17/2020</a:t>
+              <a:t>1/5/2021</a:t>
             </a:fld>
             <a:endParaRPr lang="en-US" dirty="0"/>
           </a:p>
@@ -4462,7 +4462,7 @@
           <a:p>
             <a:fld id="{48A87A34-81AB-432B-8DAE-1953F412C126}" type="datetimeFigureOut">
               <a:rPr lang="en-US" smtClean="0"/>
-              <a:t>12/17/2020</a:t>
+              <a:t>1/5/2021</a:t>
             </a:fld>
             <a:endParaRPr lang="en-US" dirty="0"/>
           </a:p>
@@ -4580,7 +4580,7 @@
           <a:p>
             <a:fld id="{48A87A34-81AB-432B-8DAE-1953F412C126}" type="datetimeFigureOut">
               <a:rPr lang="en-US" smtClean="0"/>
-              <a:t>12/17/2020</a:t>
+              <a:t>1/5/2021</a:t>
             </a:fld>
             <a:endParaRPr lang="en-US" dirty="0"/>
           </a:p>
@@ -4675,7 +4675,7 @@
           <a:p>
             <a:fld id="{48A87A34-81AB-432B-8DAE-1953F412C126}" type="datetimeFigureOut">
               <a:rPr lang="en-US" smtClean="0"/>
-              <a:t>12/17/2020</a:t>
+              <a:t>1/5/2021</a:t>
             </a:fld>
             <a:endParaRPr lang="en-US" dirty="0"/>
           </a:p>
@@ -4958,7 +4958,7 @@
           <a:p>
             <a:fld id="{48A87A34-81AB-432B-8DAE-1953F412C126}" type="datetimeFigureOut">
               <a:rPr lang="en-US" smtClean="0"/>
-              <a:t>12/17/2020</a:t>
+              <a:t>1/5/2021</a:t>
             </a:fld>
             <a:endParaRPr lang="en-US" dirty="0"/>
           </a:p>
@@ -5250,7 +5250,7 @@
             <a:fld id="{48A87A34-81AB-432B-8DAE-1953F412C126}" type="datetimeFigureOut">
               <a:rPr lang="en-US" smtClean="0"/>
               <a:pPr/>
-              <a:t>12/17/2020</a:t>
+              <a:t>1/5/2021</a:t>
             </a:fld>
             <a:endParaRPr lang="en-US" dirty="0"/>
           </a:p>
@@ -5781,7 +5781,7 @@
             <a:fld id="{48A87A34-81AB-432B-8DAE-1953F412C126}" type="datetimeFigureOut">
               <a:rPr lang="en-US" smtClean="0"/>
               <a:pPr/>
-              <a:t>12/17/2020</a:t>
+              <a:t>1/5/2021</a:t>
             </a:fld>
             <a:endParaRPr lang="en-US" dirty="0"/>
           </a:p>
@@ -6485,7 +6485,7 @@
             </a:r>
             <a:r>
               <a:rPr lang="fr-FR" dirty="0"/>
-              <a:t>) permettant, en fonction d’une adresse IP fournie, de contacter une API et recevoir en retour plusieurs informations liées à cette adresse.</a:t>
+              <a:t>) permettant de contacter une API et de recevoir, en fonction d’une adresse IP fournie, plusieurs informations liées à cette adresse.</a:t>
             </a:r>
           </a:p>
           <a:p>
@@ -6494,7 +6494,7 @@
             </a:pPr>
             <a:r>
               <a:rPr lang="fr-FR" dirty="0"/>
-              <a:t>Ces informations sont affichées à l’utilisateur avec différentes autres options telles que :</a:t>
+              <a:t>Ces informations sont affichées à l’utilisateur avec différentes options telles que :</a:t>
             </a:r>
           </a:p>
           <a:p>
@@ -6523,12 +6523,8 @@
               <a:buChar char="•"/>
             </a:pPr>
             <a:r>
-              <a:rPr lang="fr-FR" dirty="0" err="1"/>
-              <a:t>Ev</a:t>
-            </a:r>
-            <a:r>
               <a:rPr lang="fr-FR" dirty="0"/>
-              <a:t> : Gestion des paramètres</a:t>
+              <a:t>Langue d’affichage du nom de ville</a:t>
             </a:r>
           </a:p>
           <a:p>
@@ -6544,10 +6540,10 @@
       </p:sp>
       <p:pic>
         <p:nvPicPr>
-          <p:cNvPr id="5" name="Image 4">
+          <p:cNvPr id="6" name="Image 5">
             <a:extLst>
               <a:ext uri="{FF2B5EF4-FFF2-40B4-BE49-F238E27FC236}">
-                <a16:creationId xmlns:a16="http://schemas.microsoft.com/office/drawing/2014/main" id="{A7A7E736-1D7A-42D0-93F7-F5971AEE0EB8}"/>
+                <a16:creationId xmlns:a16="http://schemas.microsoft.com/office/drawing/2014/main" id="{081495BC-7879-4016-8019-3FB5AF3653B3}"/>
               </a:ext>
             </a:extLst>
           </p:cNvPr>
@@ -6556,15 +6552,16 @@
           </p:cNvPicPr>
           <p:nvPr/>
         </p:nvPicPr>
-        <p:blipFill rotWithShape="1">
+        <p:blipFill>
           <a:blip r:embed="rId2"/>
-          <a:srcRect l="1" t="28343" r="826" b="26974"/>
-          <a:stretch/>
+          <a:stretch>
+            <a:fillRect/>
+          </a:stretch>
         </p:blipFill>
         <p:spPr>
           <a:xfrm>
-            <a:off x="8585735" y="3291840"/>
-            <a:ext cx="3128210" cy="2993457"/>
+            <a:off x="9283300" y="2348397"/>
+            <a:ext cx="2219724" cy="4461264"/>
           </a:xfrm>
           <a:prstGeom prst="rect">
             <a:avLst/>
@@ -6897,7 +6894,7 @@
             </a:r>
             <a:r>
               <a:rPr lang="fr-FR" dirty="0"/>
-              <a:t> fournit les informations relatives à une adresse IP sous différents formats (XML, CSV, PHP, JSON). Pour notre cas, le format JSON est choisi. </a:t>
+              <a:t> retourne les informations relatives à une adresse IP sous différents formats (XML, CSV, PHP, JSON). Pour notre cas, le format JSON est choisi. </a:t>
             </a:r>
           </a:p>
           <a:p>
@@ -7057,7 +7054,7 @@
             </a:r>
             <a:r>
               <a:rPr lang="fr-FR" dirty="0"/>
-              <a:t>, fail)</a:t>
+              <a:t> ou fail)</a:t>
             </a:r>
           </a:p>
           <a:p>
@@ -7131,8 +7128,8 @@
         </p:blipFill>
         <p:spPr>
           <a:xfrm>
-            <a:off x="8489483" y="2118924"/>
-            <a:ext cx="3448531" cy="3962953"/>
+            <a:off x="8489484" y="2364259"/>
+            <a:ext cx="3235042" cy="3717618"/>
           </a:xfrm>
           <a:prstGeom prst="rect">
             <a:avLst/>
@@ -7217,7 +7214,7 @@
         <p:spPr>
           <a:xfrm>
             <a:off x="1484311" y="2258394"/>
-            <a:ext cx="6167774" cy="4461264"/>
+            <a:ext cx="5962694" cy="4461264"/>
           </a:xfrm>
         </p:spPr>
         <p:txBody>
@@ -7257,26 +7254,19 @@
           </a:p>
           <a:p>
             <a:r>
-              <a:rPr lang="fr-FR" dirty="0" err="1"/>
-              <a:t>Ev</a:t>
-            </a:r>
-            <a:r>
               <a:rPr lang="fr-FR" dirty="0"/>
-              <a:t>. Paramètres de application</a:t>
-            </a:r>
-            <a:br>
-              <a:rPr lang="fr-FR" dirty="0"/>
-            </a:br>
+              <a:t>Choix de la langue (nom des villes)</a:t>
+            </a:r>
             <a:endParaRPr lang="fr-CH" dirty="0"/>
           </a:p>
         </p:txBody>
       </p:sp>
       <p:pic>
         <p:nvPicPr>
-          <p:cNvPr id="6" name="Image 5">
+          <p:cNvPr id="5" name="Image 4">
             <a:extLst>
               <a:ext uri="{FF2B5EF4-FFF2-40B4-BE49-F238E27FC236}">
-                <a16:creationId xmlns:a16="http://schemas.microsoft.com/office/drawing/2014/main" id="{693EEB3F-8244-4B85-9DD2-82378FED02C5}"/>
+                <a16:creationId xmlns:a16="http://schemas.microsoft.com/office/drawing/2014/main" id="{AD42C999-A451-4E5C-80CD-474313B2D1A5}"/>
               </a:ext>
             </a:extLst>
           </p:cNvPr>
@@ -7293,8 +7283,66 @@
         </p:blipFill>
         <p:spPr>
           <a:xfrm>
-            <a:off x="9503244" y="1994087"/>
-            <a:ext cx="2408889" cy="4725571"/>
+            <a:off x="7447005" y="2292203"/>
+            <a:ext cx="2146984" cy="4315069"/>
+          </a:xfrm>
+          <a:prstGeom prst="rect">
+            <a:avLst/>
+          </a:prstGeom>
+        </p:spPr>
+      </p:pic>
+      <p:pic>
+        <p:nvPicPr>
+          <p:cNvPr id="8" name="Image 7">
+            <a:extLst>
+              <a:ext uri="{FF2B5EF4-FFF2-40B4-BE49-F238E27FC236}">
+                <a16:creationId xmlns:a16="http://schemas.microsoft.com/office/drawing/2014/main" id="{5367EA3C-0C50-466B-955C-12DE9B3A3C47}"/>
+              </a:ext>
+            </a:extLst>
+          </p:cNvPr>
+          <p:cNvPicPr>
+            <a:picLocks noChangeAspect="1"/>
+          </p:cNvPicPr>
+          <p:nvPr/>
+        </p:nvPicPr>
+        <p:blipFill rotWithShape="1">
+          <a:blip r:embed="rId3"/>
+          <a:srcRect b="62439"/>
+          <a:stretch/>
+        </p:blipFill>
+        <p:spPr>
+          <a:xfrm>
+            <a:off x="9855829" y="2292203"/>
+            <a:ext cx="2187162" cy="1620770"/>
+          </a:xfrm>
+          <a:prstGeom prst="rect">
+            <a:avLst/>
+          </a:prstGeom>
+        </p:spPr>
+      </p:pic>
+      <p:pic>
+        <p:nvPicPr>
+          <p:cNvPr id="10" name="Image 9">
+            <a:extLst>
+              <a:ext uri="{FF2B5EF4-FFF2-40B4-BE49-F238E27FC236}">
+                <a16:creationId xmlns:a16="http://schemas.microsoft.com/office/drawing/2014/main" id="{AB78B86A-200B-4C9E-9B78-8865DA4310B8}"/>
+              </a:ext>
+            </a:extLst>
+          </p:cNvPr>
+          <p:cNvPicPr>
+            <a:picLocks noChangeAspect="1"/>
+          </p:cNvPicPr>
+          <p:nvPr/>
+        </p:nvPicPr>
+        <p:blipFill rotWithShape="1">
+          <a:blip r:embed="rId4"/>
+          <a:srcRect b="64472"/>
+          <a:stretch/>
+        </p:blipFill>
+        <p:spPr>
+          <a:xfrm>
+            <a:off x="9855829" y="4135395"/>
+            <a:ext cx="2187376" cy="1533180"/>
           </a:xfrm>
           <a:prstGeom prst="rect">
             <a:avLst/>
@@ -7336,7 +7384,7 @@
           <p:cNvPr id="2" name="Titre 1">
             <a:extLst>
               <a:ext uri="{FF2B5EF4-FFF2-40B4-BE49-F238E27FC236}">
-                <a16:creationId xmlns:a16="http://schemas.microsoft.com/office/drawing/2014/main" id="{BDC96AE2-61DA-4041-9BF7-CED69D6ADA66}"/>
+                <a16:creationId xmlns:a16="http://schemas.microsoft.com/office/drawing/2014/main" id="{C9B7FBE7-3E5E-4287-9AD7-6874245C1780}"/>
               </a:ext>
             </a:extLst>
           </p:cNvPr>
@@ -7354,7 +7402,7 @@
           <a:p>
             <a:r>
               <a:rPr lang="fr-FR" dirty="0"/>
-              <a:t>Gestion des activités</a:t>
+              <a:t>Fonctionnalités de l’application</a:t>
             </a:r>
             <a:endParaRPr lang="fr-CH" dirty="0"/>
           </a:p>
@@ -7365,7 +7413,7 @@
           <p:cNvPr id="3" name="Espace réservé du contenu 2">
             <a:extLst>
               <a:ext uri="{FF2B5EF4-FFF2-40B4-BE49-F238E27FC236}">
-                <a16:creationId xmlns:a16="http://schemas.microsoft.com/office/drawing/2014/main" id="{E6BBA3A6-F120-4D9A-BA1F-7BD04B86E8CF}"/>
+                <a16:creationId xmlns:a16="http://schemas.microsoft.com/office/drawing/2014/main" id="{665B4956-5A41-4A26-90FF-161DE559A06B}"/>
               </a:ext>
             </a:extLst>
           </p:cNvPr>
@@ -7378,8 +7426,8 @@
         </p:nvSpPr>
         <p:spPr>
           <a:xfrm>
-            <a:off x="1484310" y="2252312"/>
-            <a:ext cx="10018713" cy="3720975"/>
+            <a:off x="1484311" y="2258394"/>
+            <a:ext cx="6167774" cy="4461264"/>
           </a:xfrm>
         </p:spPr>
         <p:txBody>
@@ -7390,40 +7438,133 @@
           <a:p>
             <a:r>
               <a:rPr lang="fr-FR" dirty="0"/>
-              <a:t>Activité principale</a:t>
-            </a:r>
-          </a:p>
-          <a:p>
+              <a:t>Gestion d’une liste d’adresses IP (avec un commentaire) pour utilisation ultérieure.</a:t>
+            </a:r>
+          </a:p>
+          <a:p>
+            <a:pPr lvl="1"/>
             <a:r>
               <a:rPr lang="fr-FR" dirty="0"/>
-              <a:t>Activité pour la gestion de la liste des adresses IP</a:t>
-            </a:r>
-          </a:p>
-          <a:p>
+              <a:t>Ajout d’IP à la liste </a:t>
+            </a:r>
+          </a:p>
+          <a:p>
+            <a:pPr lvl="1"/>
             <a:r>
               <a:rPr lang="fr-FR" dirty="0"/>
-              <a:t>Activité pour l’affichage de la carte géographique</a:t>
-            </a:r>
-          </a:p>
-          <a:p>
-            <a:r>
-              <a:rPr lang="fr-FR" dirty="0" err="1"/>
-              <a:t>Ev</a:t>
-            </a:r>
-            <a:r>
-              <a:rPr lang="fr-FR" dirty="0"/>
-              <a:t>. Activité pour la gestion des paramètres</a:t>
-            </a:r>
-          </a:p>
-          <a:p>
+              <a:t>Utilisation d’une IP (par clique court)</a:t>
+            </a:r>
+          </a:p>
+          <a:p>
+            <a:pPr lvl="1"/>
+            <a:r>
+              <a:rPr lang="fr-CH" dirty="0"/>
+              <a:t>Suppression d’une IP (par clique long)</a:t>
+            </a:r>
+          </a:p>
+          <a:p>
+            <a:pPr lvl="1"/>
+            <a:r>
+              <a:rPr lang="fr-CH" dirty="0"/>
+              <a:t>Suppression de toutes les IP</a:t>
+            </a:r>
+          </a:p>
+          <a:p>
+            <a:pPr lvl="1"/>
+            <a:r>
+              <a:rPr lang="fr-CH" dirty="0"/>
+              <a:t>Ajout de valeurs de tests (pour contrôle de la </a:t>
+            </a:r>
+            <a:br>
+              <a:rPr lang="fr-CH" dirty="0"/>
+            </a:br>
+            <a:r>
+              <a:rPr lang="fr-CH" dirty="0"/>
+              <a:t>sauvegarde (</a:t>
+            </a:r>
+            <a:r>
+              <a:rPr lang="fr-CH" dirty="0" err="1"/>
+              <a:t>sharedPreferences</a:t>
+            </a:r>
+            <a:r>
+              <a:rPr lang="fr-CH" dirty="0"/>
+              <a:t>))</a:t>
+            </a:r>
+          </a:p>
+          <a:p>
+            <a:pPr lvl="1"/>
+            <a:endParaRPr lang="fr-CH" dirty="0"/>
+          </a:p>
+          <a:p>
+            <a:pPr lvl="1"/>
             <a:endParaRPr lang="fr-FR" dirty="0"/>
           </a:p>
         </p:txBody>
       </p:sp>
+      <p:pic>
+        <p:nvPicPr>
+          <p:cNvPr id="10" name="Image 9">
+            <a:extLst>
+              <a:ext uri="{FF2B5EF4-FFF2-40B4-BE49-F238E27FC236}">
+                <a16:creationId xmlns:a16="http://schemas.microsoft.com/office/drawing/2014/main" id="{D963BFFB-5779-4E05-95C5-1EC02C741109}"/>
+              </a:ext>
+            </a:extLst>
+          </p:cNvPr>
+          <p:cNvPicPr>
+            <a:picLocks noChangeAspect="1"/>
+          </p:cNvPicPr>
+          <p:nvPr/>
+        </p:nvPicPr>
+        <p:blipFill>
+          <a:blip r:embed="rId2"/>
+          <a:stretch>
+            <a:fillRect/>
+          </a:stretch>
+        </p:blipFill>
+        <p:spPr>
+          <a:xfrm>
+            <a:off x="7652085" y="2306986"/>
+            <a:ext cx="1952038" cy="3851189"/>
+          </a:xfrm>
+          <a:prstGeom prst="rect">
+            <a:avLst/>
+          </a:prstGeom>
+        </p:spPr>
+      </p:pic>
+      <p:pic>
+        <p:nvPicPr>
+          <p:cNvPr id="12" name="Image 11">
+            <a:extLst>
+              <a:ext uri="{FF2B5EF4-FFF2-40B4-BE49-F238E27FC236}">
+                <a16:creationId xmlns:a16="http://schemas.microsoft.com/office/drawing/2014/main" id="{C9073B00-75E6-4052-A8E7-1884F46DA773}"/>
+              </a:ext>
+            </a:extLst>
+          </p:cNvPr>
+          <p:cNvPicPr>
+            <a:picLocks noChangeAspect="1"/>
+          </p:cNvPicPr>
+          <p:nvPr/>
+        </p:nvPicPr>
+        <p:blipFill>
+          <a:blip r:embed="rId3"/>
+          <a:stretch>
+            <a:fillRect/>
+          </a:stretch>
+        </p:blipFill>
+        <p:spPr>
+          <a:xfrm>
+            <a:off x="9818744" y="2306986"/>
+            <a:ext cx="1959147" cy="3865214"/>
+          </a:xfrm>
+          <a:prstGeom prst="rect">
+            <a:avLst/>
+          </a:prstGeom>
+        </p:spPr>
+      </p:pic>
     </p:spTree>
     <p:extLst>
       <p:ext uri="{BB962C8B-B14F-4D97-AF65-F5344CB8AC3E}">
-        <p14:creationId xmlns:p14="http://schemas.microsoft.com/office/powerpoint/2010/main" val="2993571073"/>
+        <p14:creationId xmlns:p14="http://schemas.microsoft.com/office/powerpoint/2010/main" val="3179281328"/>
       </p:ext>
     </p:extLst>
   </p:cSld>
@@ -7473,7 +7614,7 @@
           <a:p>
             <a:r>
               <a:rPr lang="fr-FR" dirty="0"/>
-              <a:t>Fonctionnalités utilisées</a:t>
+              <a:t>Gestion des activités</a:t>
             </a:r>
             <a:endParaRPr lang="fr-CH" dirty="0"/>
           </a:p>
@@ -7498,70 +7639,242 @@
         <p:spPr>
           <a:xfrm>
             <a:off x="1484310" y="2252312"/>
-            <a:ext cx="10018713" cy="3720975"/>
+            <a:ext cx="3787023" cy="3720975"/>
           </a:xfrm>
         </p:spPr>
         <p:txBody>
           <a:bodyPr anchor="t" anchorCtr="0">
-            <a:noAutofit/>
+            <a:normAutofit/>
           </a:bodyPr>
           <a:lstStyle/>
           <a:p>
             <a:r>
               <a:rPr lang="fr-FR" dirty="0"/>
-              <a:t>Intent  :					Pour passage d’info entre les activités</a:t>
+              <a:t>Activité principale</a:t>
             </a:r>
           </a:p>
           <a:p>
             <a:r>
               <a:rPr lang="fr-FR" dirty="0"/>
-              <a:t>Adapter :				Pour gestion de l’affichage des données d’un tableau 							dans une liste</a:t>
-            </a:r>
-          </a:p>
-          <a:p>
-            <a:r>
-              <a:rPr lang="fr-FR" dirty="0" err="1"/>
-              <a:t>SharedPreferences</a:t>
-            </a:r>
-            <a:r>
-              <a:rPr lang="fr-FR" dirty="0"/>
-              <a:t> :	Pour sauvegarde et restauration de données de 								l’application</a:t>
-            </a:r>
-          </a:p>
-          <a:p>
-            <a:r>
-              <a:rPr lang="fr-FR" dirty="0"/>
-              <a:t>Divers					</a:t>
-            </a:r>
-            <a:r>
-              <a:rPr lang="fr-FR" dirty="0" err="1"/>
-              <a:t>Maps</a:t>
-            </a:r>
-            <a:r>
-              <a:rPr lang="fr-FR" dirty="0"/>
-              <a:t> Google</a:t>
+              <a:t>Activité pour la gestion </a:t>
             </a:r>
             <a:br>
               <a:rPr lang="fr-FR" dirty="0"/>
             </a:br>
             <a:r>
               <a:rPr lang="fr-FR" dirty="0"/>
-              <a:t>							Regex pour validation du format des adresses IP</a:t>
-            </a:r>
-          </a:p>
-          <a:p>
-            <a:pPr lvl="1"/>
+              <a:t>de la liste des adresses IP</a:t>
+            </a:r>
+          </a:p>
+          <a:p>
+            <a:r>
+              <a:rPr lang="fr-FR" dirty="0"/>
+              <a:t>Activité pour l’affichage </a:t>
+            </a:r>
+            <a:br>
+              <a:rPr lang="fr-FR" dirty="0"/>
+            </a:br>
+            <a:r>
+              <a:rPr lang="fr-FR" dirty="0"/>
+              <a:t>de la carte géographique</a:t>
+            </a:r>
+          </a:p>
+          <a:p>
+            <a:pPr marL="0" indent="0">
+              <a:buNone/>
+            </a:pPr>
             <a:endParaRPr lang="fr-FR" dirty="0"/>
           </a:p>
-          <a:p>
-            <a:endParaRPr lang="fr-FR" dirty="0"/>
-          </a:p>
-        </p:txBody>
-      </p:sp>
+        </p:txBody>
+      </p:sp>
+      <p:pic>
+        <p:nvPicPr>
+          <p:cNvPr id="5" name="Image 4">
+            <a:extLst>
+              <a:ext uri="{FF2B5EF4-FFF2-40B4-BE49-F238E27FC236}">
+                <a16:creationId xmlns:a16="http://schemas.microsoft.com/office/drawing/2014/main" id="{E2EFB53E-1C5B-4C8E-8A4E-155B84CBCDFE}"/>
+              </a:ext>
+            </a:extLst>
+          </p:cNvPr>
+          <p:cNvPicPr>
+            <a:picLocks noChangeAspect="1"/>
+          </p:cNvPicPr>
+          <p:nvPr/>
+        </p:nvPicPr>
+        <p:blipFill>
+          <a:blip r:embed="rId2"/>
+          <a:stretch>
+            <a:fillRect/>
+          </a:stretch>
+        </p:blipFill>
+        <p:spPr>
+          <a:xfrm>
+            <a:off x="5792390" y="2852462"/>
+            <a:ext cx="1926464" cy="3871862"/>
+          </a:xfrm>
+          <a:prstGeom prst="rect">
+            <a:avLst/>
+          </a:prstGeom>
+        </p:spPr>
+      </p:pic>
+      <p:pic>
+        <p:nvPicPr>
+          <p:cNvPr id="7" name="Image 6">
+            <a:extLst>
+              <a:ext uri="{FF2B5EF4-FFF2-40B4-BE49-F238E27FC236}">
+                <a16:creationId xmlns:a16="http://schemas.microsoft.com/office/drawing/2014/main" id="{FE01E433-BD1E-499C-9076-E6B9D74CAD55}"/>
+              </a:ext>
+            </a:extLst>
+          </p:cNvPr>
+          <p:cNvPicPr>
+            <a:picLocks noChangeAspect="1"/>
+          </p:cNvPicPr>
+          <p:nvPr/>
+        </p:nvPicPr>
+        <p:blipFill>
+          <a:blip r:embed="rId3"/>
+          <a:stretch>
+            <a:fillRect/>
+          </a:stretch>
+        </p:blipFill>
+        <p:spPr>
+          <a:xfrm>
+            <a:off x="10395784" y="3275475"/>
+            <a:ext cx="1722076" cy="3461077"/>
+          </a:xfrm>
+          <a:prstGeom prst="rect">
+            <a:avLst/>
+          </a:prstGeom>
+        </p:spPr>
+      </p:pic>
+      <p:cxnSp>
+        <p:nvCxnSpPr>
+          <p:cNvPr id="11" name="Connecteur droit avec flèche 10">
+            <a:extLst>
+              <a:ext uri="{FF2B5EF4-FFF2-40B4-BE49-F238E27FC236}">
+                <a16:creationId xmlns:a16="http://schemas.microsoft.com/office/drawing/2014/main" id="{5387D832-988E-45B7-BD64-8BEF4099A746}"/>
+              </a:ext>
+            </a:extLst>
+          </p:cNvPr>
+          <p:cNvCxnSpPr>
+            <a:cxnSpLocks/>
+          </p:cNvCxnSpPr>
+          <p:nvPr/>
+        </p:nvCxnSpPr>
+        <p:spPr>
+          <a:xfrm flipV="1">
+            <a:off x="7614020" y="6252519"/>
+            <a:ext cx="2839796" cy="1"/>
+          </a:xfrm>
+          <a:prstGeom prst="straightConnector1">
+            <a:avLst/>
+          </a:prstGeom>
+          <a:ln w="38100" cap="flat" cmpd="sng" algn="ctr">
+            <a:solidFill>
+              <a:srgbClr val="0070C0"/>
+            </a:solidFill>
+            <a:prstDash val="solid"/>
+            <a:round/>
+            <a:headEnd type="arrow" w="med" len="med"/>
+            <a:tailEnd type="arrow" w="med" len="med"/>
+          </a:ln>
+        </p:spPr>
+        <p:style>
+          <a:lnRef idx="0">
+            <a:scrgbClr r="0" g="0" b="0"/>
+          </a:lnRef>
+          <a:fillRef idx="0">
+            <a:scrgbClr r="0" g="0" b="0"/>
+          </a:fillRef>
+          <a:effectRef idx="0">
+            <a:scrgbClr r="0" g="0" b="0"/>
+          </a:effectRef>
+          <a:fontRef idx="minor">
+            <a:schemeClr val="tx1"/>
+          </a:fontRef>
+        </p:style>
+      </p:cxnSp>
+      <p:cxnSp>
+        <p:nvCxnSpPr>
+          <p:cNvPr id="13" name="Connecteur droit avec flèche 12">
+            <a:extLst>
+              <a:ext uri="{FF2B5EF4-FFF2-40B4-BE49-F238E27FC236}">
+                <a16:creationId xmlns:a16="http://schemas.microsoft.com/office/drawing/2014/main" id="{A9DB8251-E0DD-4C25-8F99-16EBA83D110E}"/>
+              </a:ext>
+            </a:extLst>
+          </p:cNvPr>
+          <p:cNvCxnSpPr>
+            <a:cxnSpLocks/>
+          </p:cNvCxnSpPr>
+          <p:nvPr/>
+        </p:nvCxnSpPr>
+        <p:spPr>
+          <a:xfrm>
+            <a:off x="7614020" y="3429000"/>
+            <a:ext cx="796442" cy="0"/>
+          </a:xfrm>
+          <a:prstGeom prst="straightConnector1">
+            <a:avLst/>
+          </a:prstGeom>
+          <a:ln w="38100" cap="flat" cmpd="sng" algn="ctr">
+            <a:solidFill>
+              <a:srgbClr val="0070C0"/>
+            </a:solidFill>
+            <a:prstDash val="solid"/>
+            <a:round/>
+            <a:headEnd type="arrow" w="med" len="med"/>
+            <a:tailEnd type="arrow" w="med" len="med"/>
+          </a:ln>
+        </p:spPr>
+        <p:style>
+          <a:lnRef idx="0">
+            <a:scrgbClr r="0" g="0" b="0"/>
+          </a:lnRef>
+          <a:fillRef idx="0">
+            <a:scrgbClr r="0" g="0" b="0"/>
+          </a:fillRef>
+          <a:effectRef idx="0">
+            <a:scrgbClr r="0" g="0" b="0"/>
+          </a:effectRef>
+          <a:fontRef idx="minor">
+            <a:schemeClr val="tx1"/>
+          </a:fontRef>
+        </p:style>
+      </p:cxnSp>
+      <p:pic>
+        <p:nvPicPr>
+          <p:cNvPr id="28" name="Image 27">
+            <a:extLst>
+              <a:ext uri="{FF2B5EF4-FFF2-40B4-BE49-F238E27FC236}">
+                <a16:creationId xmlns:a16="http://schemas.microsoft.com/office/drawing/2014/main" id="{492AED0B-1591-4DE4-A915-D9359D0650E5}"/>
+              </a:ext>
+            </a:extLst>
+          </p:cNvPr>
+          <p:cNvPicPr>
+            <a:picLocks noChangeAspect="1"/>
+          </p:cNvPicPr>
+          <p:nvPr/>
+        </p:nvPicPr>
+        <p:blipFill>
+          <a:blip r:embed="rId4"/>
+          <a:stretch>
+            <a:fillRect/>
+          </a:stretch>
+        </p:blipFill>
+        <p:spPr>
+          <a:xfrm>
+            <a:off x="8410462" y="1937627"/>
+            <a:ext cx="1722077" cy="3397497"/>
+          </a:xfrm>
+          <a:prstGeom prst="rect">
+            <a:avLst/>
+          </a:prstGeom>
+        </p:spPr>
+      </p:pic>
     </p:spTree>
     <p:extLst>
       <p:ext uri="{BB962C8B-B14F-4D97-AF65-F5344CB8AC3E}">
-        <p14:creationId xmlns:p14="http://schemas.microsoft.com/office/powerpoint/2010/main" val="2415226469"/>
+        <p14:creationId xmlns:p14="http://schemas.microsoft.com/office/powerpoint/2010/main" val="2993571073"/>
       </p:ext>
     </p:extLst>
   </p:cSld>
@@ -7611,7 +7924,7 @@
           <a:p>
             <a:r>
               <a:rPr lang="fr-FR" dirty="0"/>
-              <a:t>Conclusion</a:t>
+              <a:t>Fonctionnalités utilisées</a:t>
             </a:r>
             <a:endParaRPr lang="fr-CH" dirty="0"/>
           </a:p>
@@ -7635,36 +7948,88 @@
         </p:nvSpPr>
         <p:spPr>
           <a:xfrm>
-            <a:off x="1484310" y="2438399"/>
-            <a:ext cx="10106007" cy="3641767"/>
+            <a:off x="1484310" y="2252312"/>
+            <a:ext cx="10018713" cy="3720975"/>
           </a:xfrm>
         </p:spPr>
         <p:txBody>
           <a:bodyPr anchor="t" anchorCtr="0">
-            <a:normAutofit/>
+            <a:noAutofit/>
           </a:bodyPr>
           <a:lstStyle/>
           <a:p>
             <a:r>
               <a:rPr lang="fr-FR" dirty="0"/>
-              <a:t>Projet intéressant permettant de mettre en pratique la théorie expliqué durant les cours.</a:t>
-            </a:r>
-          </a:p>
-          <a:p>
+              <a:t>Intent :					Pour passage d’info entre les activités</a:t>
+            </a:r>
+          </a:p>
+          <a:p>
+            <a:r>
+              <a:rPr lang="fr-FR" dirty="0" err="1"/>
+              <a:t>AsyncTask</a:t>
+            </a:r>
+            <a:r>
+              <a:rPr lang="fr-FR" dirty="0"/>
+              <a:t> :				Pour la gestion de l’appel à l’API </a:t>
+            </a:r>
+          </a:p>
+          <a:p>
+            <a:r>
+              <a:rPr lang="fr-FR" dirty="0"/>
+              <a:t>Adapter :				Pour gestion de l’affichage des données d’un tableau 							dans une liste</a:t>
+            </a:r>
+          </a:p>
+          <a:p>
+            <a:r>
+              <a:rPr lang="fr-FR" dirty="0" err="1"/>
+              <a:t>SharedPreferences</a:t>
+            </a:r>
+            <a:r>
+              <a:rPr lang="fr-FR" dirty="0"/>
+              <a:t> :	Pour sauvegarde et restauration des données de 								l’application</a:t>
+            </a:r>
+          </a:p>
+          <a:p>
+            <a:r>
+              <a:rPr lang="fr-FR" dirty="0"/>
+              <a:t>Divers :					</a:t>
+            </a:r>
+            <a:r>
+              <a:rPr lang="fr-FR" dirty="0" err="1"/>
+              <a:t>Maps</a:t>
+            </a:r>
+            <a:r>
+              <a:rPr lang="fr-FR" dirty="0"/>
+              <a:t> Google</a:t>
+            </a:r>
+            <a:br>
+              <a:rPr lang="fr-FR" dirty="0"/>
+            </a:br>
+            <a:r>
+              <a:rPr lang="fr-FR" dirty="0"/>
+              <a:t>							Ajout d’un menu d’options (simple)</a:t>
+            </a:r>
+            <a:br>
+              <a:rPr lang="fr-FR" dirty="0"/>
+            </a:br>
+            <a:r>
+              <a:rPr lang="fr-FR" dirty="0"/>
+              <a:t>							Regex pour validation du format des adresses IP</a:t>
+            </a:r>
+          </a:p>
+          <a:p>
+            <a:pPr lvl="1"/>
             <a:endParaRPr lang="fr-FR" dirty="0"/>
           </a:p>
           <a:p>
-            <a:pPr marL="0" indent="0">
-              <a:buNone/>
-            </a:pPr>
-            <a:endParaRPr lang="fr-CH" sz="2000" dirty="0"/>
+            <a:endParaRPr lang="fr-FR" dirty="0"/>
           </a:p>
         </p:txBody>
       </p:sp>
     </p:spTree>
     <p:extLst>
       <p:ext uri="{BB962C8B-B14F-4D97-AF65-F5344CB8AC3E}">
-        <p14:creationId xmlns:p14="http://schemas.microsoft.com/office/powerpoint/2010/main" val="2138255372"/>
+        <p14:creationId xmlns:p14="http://schemas.microsoft.com/office/powerpoint/2010/main" val="2415226469"/>
       </p:ext>
     </p:extLst>
   </p:cSld>
@@ -7714,11 +8079,7 @@
           <a:p>
             <a:r>
               <a:rPr lang="fr-FR" dirty="0"/>
-              <a:t>Merci de </a:t>
-            </a:r>
-            <a:r>
-              <a:rPr lang="fr-FR"/>
-              <a:t>votre attention !</a:t>
+              <a:t>Conclusion</a:t>
             </a:r>
             <a:endParaRPr lang="fr-CH" dirty="0"/>
           </a:p>
@@ -7747,25 +8108,58 @@
           </a:xfrm>
         </p:spPr>
         <p:txBody>
-          <a:bodyPr anchor="ctr" anchorCtr="0">
-            <a:normAutofit/>
+          <a:bodyPr anchor="t" anchorCtr="0">
+            <a:normAutofit fontScale="92500" lnSpcReduction="10000"/>
           </a:bodyPr>
           <a:lstStyle/>
           <a:p>
+            <a:r>
+              <a:rPr lang="fr-FR" dirty="0"/>
+              <a:t>Projet intéressant permettant de mettre en pratique la théorie expliquée durant les cours.</a:t>
+            </a:r>
+          </a:p>
+          <a:p>
+            <a:r>
+              <a:rPr lang="fr-FR" dirty="0"/>
+              <a:t>On constate qu’il y a plusieurs méthodes pour effectuer certaines opérations, avec des avantages et inconvénients pour chacune. Difficile de choisir la bonne méthode dès le début.</a:t>
+            </a:r>
+          </a:p>
+          <a:p>
+            <a:r>
+              <a:rPr lang="fr-FR" dirty="0"/>
+              <a:t>La mise en place des « </a:t>
+            </a:r>
+            <a:r>
+              <a:rPr lang="fr-FR" dirty="0" err="1"/>
+              <a:t>layout</a:t>
+            </a:r>
+            <a:r>
+              <a:rPr lang="fr-FR"/>
+              <a:t> » </a:t>
+            </a:r>
+            <a:r>
+              <a:rPr lang="fr-FR" dirty="0"/>
+              <a:t>demande de la pratique pour bien maîtriser les possibilités</a:t>
+            </a:r>
+          </a:p>
+          <a:p>
+            <a:endParaRPr lang="fr-FR" dirty="0"/>
+          </a:p>
+          <a:p>
             <a:pPr marL="0" indent="0" algn="ctr">
               <a:buNone/>
             </a:pPr>
             <a:r>
-              <a:rPr lang="fr-FR" sz="3600" dirty="0"/>
-              <a:t>Et au prochain </a:t>
-            </a:r>
-            <a:r>
-              <a:rPr lang="fr-FR" sz="3600" dirty="0">
+              <a:rPr lang="fr-FR" dirty="0"/>
+              <a:t>Merci de votre attention et au prochain </a:t>
+            </a:r>
+            <a:r>
+              <a:rPr lang="fr-FR" dirty="0">
                 <a:sym typeface="Wingdings" panose="05000000000000000000" pitchFamily="2" charset="2"/>
               </a:rPr>
               <a:t></a:t>
             </a:r>
-            <a:endParaRPr lang="fr-FR" sz="3200" dirty="0"/>
+            <a:endParaRPr lang="fr-FR" dirty="0"/>
           </a:p>
           <a:p>
             <a:pPr marL="0" indent="0">
@@ -7778,7 +8172,7 @@
     </p:spTree>
     <p:extLst>
       <p:ext uri="{BB962C8B-B14F-4D97-AF65-F5344CB8AC3E}">
-        <p14:creationId xmlns:p14="http://schemas.microsoft.com/office/powerpoint/2010/main" val="2704191864"/>
+        <p14:creationId xmlns:p14="http://schemas.microsoft.com/office/powerpoint/2010/main" val="2138255372"/>
       </p:ext>
     </p:extLst>
   </p:cSld>

</xml_diff>

<commit_message>
Improve Readme.md with images. Improve comments in code
</commit_message>
<xml_diff>
--- a/0_Présentation - IP-Locator.pptx
+++ b/0_Présentation - IP-Locator.pptx
@@ -4,6 +4,9 @@
   <p:sldMasterIdLst>
     <p:sldMasterId id="2147483796" r:id="rId1"/>
   </p:sldMasterIdLst>
+  <p:notesMasterIdLst>
+    <p:notesMasterId r:id="rId12"/>
+  </p:notesMasterIdLst>
   <p:sldIdLst>
     <p:sldId id="256" r:id="rId2"/>
     <p:sldId id="263" r:id="rId3"/>
@@ -13,7 +16,8 @@
     <p:sldId id="267" r:id="rId7"/>
     <p:sldId id="258" r:id="rId8"/>
     <p:sldId id="266" r:id="rId9"/>
-    <p:sldId id="262" r:id="rId10"/>
+    <p:sldId id="268" r:id="rId10"/>
+    <p:sldId id="262" r:id="rId11"/>
   </p:sldIdLst>
   <p:sldSz cx="12192000" cy="6858000"/>
   <p:notesSz cx="6858000" cy="9144000"/>
@@ -130,6 +134,440 @@
     </p:extLst>
   </p:cmAuthor>
 </p:cmAuthorLst>
+</file>
+
+<file path=ppt/notesMasters/notesMaster1.xml><?xml version="1.0" encoding="utf-8"?>
+<p:notesMaster xmlns:a="http://schemas.openxmlformats.org/drawingml/2006/main" xmlns:r="http://schemas.openxmlformats.org/officeDocument/2006/relationships" xmlns:p="http://schemas.openxmlformats.org/presentationml/2006/main">
+  <p:cSld>
+    <p:bg>
+      <p:bgRef idx="1001">
+        <a:schemeClr val="bg1"/>
+      </p:bgRef>
+    </p:bg>
+    <p:spTree>
+      <p:nvGrpSpPr>
+        <p:cNvPr id="1" name=""/>
+        <p:cNvGrpSpPr/>
+        <p:nvPr/>
+      </p:nvGrpSpPr>
+      <p:grpSpPr>
+        <a:xfrm>
+          <a:off x="0" y="0"/>
+          <a:ext cx="0" cy="0"/>
+          <a:chOff x="0" y="0"/>
+          <a:chExt cx="0" cy="0"/>
+        </a:xfrm>
+      </p:grpSpPr>
+      <p:sp>
+        <p:nvSpPr>
+          <p:cNvPr id="2" name="Espace réservé de l'en-tête 1"/>
+          <p:cNvSpPr>
+            <a:spLocks noGrp="1"/>
+          </p:cNvSpPr>
+          <p:nvPr>
+            <p:ph type="hdr" sz="quarter"/>
+          </p:nvPr>
+        </p:nvSpPr>
+        <p:spPr>
+          <a:xfrm>
+            <a:off x="0" y="0"/>
+            <a:ext cx="2971800" cy="458788"/>
+          </a:xfrm>
+          <a:prstGeom prst="rect">
+            <a:avLst/>
+          </a:prstGeom>
+        </p:spPr>
+        <p:txBody>
+          <a:bodyPr vert="horz" lIns="91440" tIns="45720" rIns="91440" bIns="45720" rtlCol="0"/>
+          <a:lstStyle>
+            <a:lvl1pPr algn="l">
+              <a:defRPr sz="1200"/>
+            </a:lvl1pPr>
+          </a:lstStyle>
+          <a:p>
+            <a:endParaRPr lang="fr-CH"/>
+          </a:p>
+        </p:txBody>
+      </p:sp>
+      <p:sp>
+        <p:nvSpPr>
+          <p:cNvPr id="3" name="Espace réservé de la date 2"/>
+          <p:cNvSpPr>
+            <a:spLocks noGrp="1"/>
+          </p:cNvSpPr>
+          <p:nvPr>
+            <p:ph type="dt" idx="1"/>
+          </p:nvPr>
+        </p:nvSpPr>
+        <p:spPr>
+          <a:xfrm>
+            <a:off x="3884613" y="0"/>
+            <a:ext cx="2971800" cy="458788"/>
+          </a:xfrm>
+          <a:prstGeom prst="rect">
+            <a:avLst/>
+          </a:prstGeom>
+        </p:spPr>
+        <p:txBody>
+          <a:bodyPr vert="horz" lIns="91440" tIns="45720" rIns="91440" bIns="45720" rtlCol="0"/>
+          <a:lstStyle>
+            <a:lvl1pPr algn="r">
+              <a:defRPr sz="1200"/>
+            </a:lvl1pPr>
+          </a:lstStyle>
+          <a:p>
+            <a:fld id="{4A8F74B1-64EA-4EE6-B01E-98B5F93A6A1E}" type="datetimeFigureOut">
+              <a:rPr lang="fr-CH" smtClean="0"/>
+              <a:t>10.01.2021</a:t>
+            </a:fld>
+            <a:endParaRPr lang="fr-CH"/>
+          </a:p>
+        </p:txBody>
+      </p:sp>
+      <p:sp>
+        <p:nvSpPr>
+          <p:cNvPr id="4" name="Espace réservé de l'image des diapositives 3"/>
+          <p:cNvSpPr>
+            <a:spLocks noGrp="1" noRot="1" noChangeAspect="1"/>
+          </p:cNvSpPr>
+          <p:nvPr>
+            <p:ph type="sldImg" idx="2"/>
+          </p:nvPr>
+        </p:nvSpPr>
+        <p:spPr>
+          <a:xfrm>
+            <a:off x="685800" y="1143000"/>
+            <a:ext cx="5486400" cy="3086100"/>
+          </a:xfrm>
+          <a:prstGeom prst="rect">
+            <a:avLst/>
+          </a:prstGeom>
+          <a:noFill/>
+          <a:ln w="12700">
+            <a:solidFill>
+              <a:prstClr val="black"/>
+            </a:solidFill>
+          </a:ln>
+        </p:spPr>
+        <p:txBody>
+          <a:bodyPr vert="horz" lIns="91440" tIns="45720" rIns="91440" bIns="45720" rtlCol="0" anchor="ctr"/>
+          <a:lstStyle/>
+          <a:p>
+            <a:endParaRPr lang="fr-CH"/>
+          </a:p>
+        </p:txBody>
+      </p:sp>
+      <p:sp>
+        <p:nvSpPr>
+          <p:cNvPr id="5" name="Espace réservé des notes 4"/>
+          <p:cNvSpPr>
+            <a:spLocks noGrp="1"/>
+          </p:cNvSpPr>
+          <p:nvPr>
+            <p:ph type="body" sz="quarter" idx="3"/>
+          </p:nvPr>
+        </p:nvSpPr>
+        <p:spPr>
+          <a:xfrm>
+            <a:off x="685800" y="4400550"/>
+            <a:ext cx="5486400" cy="3600450"/>
+          </a:xfrm>
+          <a:prstGeom prst="rect">
+            <a:avLst/>
+          </a:prstGeom>
+        </p:spPr>
+        <p:txBody>
+          <a:bodyPr vert="horz" lIns="91440" tIns="45720" rIns="91440" bIns="45720" rtlCol="0"/>
+          <a:lstStyle/>
+          <a:p>
+            <a:pPr lvl="0"/>
+            <a:r>
+              <a:rPr lang="fr-FR"/>
+              <a:t>Cliquez pour modifier les styles du texte du masque</a:t>
+            </a:r>
+          </a:p>
+          <a:p>
+            <a:pPr lvl="1"/>
+            <a:r>
+              <a:rPr lang="fr-FR"/>
+              <a:t>Deuxième niveau</a:t>
+            </a:r>
+          </a:p>
+          <a:p>
+            <a:pPr lvl="2"/>
+            <a:r>
+              <a:rPr lang="fr-FR"/>
+              <a:t>Troisième niveau</a:t>
+            </a:r>
+          </a:p>
+          <a:p>
+            <a:pPr lvl="3"/>
+            <a:r>
+              <a:rPr lang="fr-FR"/>
+              <a:t>Quatrième niveau</a:t>
+            </a:r>
+          </a:p>
+          <a:p>
+            <a:pPr lvl="4"/>
+            <a:r>
+              <a:rPr lang="fr-FR"/>
+              <a:t>Cinquième niveau</a:t>
+            </a:r>
+            <a:endParaRPr lang="fr-CH"/>
+          </a:p>
+        </p:txBody>
+      </p:sp>
+      <p:sp>
+        <p:nvSpPr>
+          <p:cNvPr id="6" name="Espace réservé du pied de page 5"/>
+          <p:cNvSpPr>
+            <a:spLocks noGrp="1"/>
+          </p:cNvSpPr>
+          <p:nvPr>
+            <p:ph type="ftr" sz="quarter" idx="4"/>
+          </p:nvPr>
+        </p:nvSpPr>
+        <p:spPr>
+          <a:xfrm>
+            <a:off x="0" y="8685213"/>
+            <a:ext cx="2971800" cy="458787"/>
+          </a:xfrm>
+          <a:prstGeom prst="rect">
+            <a:avLst/>
+          </a:prstGeom>
+        </p:spPr>
+        <p:txBody>
+          <a:bodyPr vert="horz" lIns="91440" tIns="45720" rIns="91440" bIns="45720" rtlCol="0" anchor="b"/>
+          <a:lstStyle>
+            <a:lvl1pPr algn="l">
+              <a:defRPr sz="1200"/>
+            </a:lvl1pPr>
+          </a:lstStyle>
+          <a:p>
+            <a:endParaRPr lang="fr-CH"/>
+          </a:p>
+        </p:txBody>
+      </p:sp>
+      <p:sp>
+        <p:nvSpPr>
+          <p:cNvPr id="7" name="Espace réservé du numéro de diapositive 6"/>
+          <p:cNvSpPr>
+            <a:spLocks noGrp="1"/>
+          </p:cNvSpPr>
+          <p:nvPr>
+            <p:ph type="sldNum" sz="quarter" idx="5"/>
+          </p:nvPr>
+        </p:nvSpPr>
+        <p:spPr>
+          <a:xfrm>
+            <a:off x="3884613" y="8685213"/>
+            <a:ext cx="2971800" cy="458787"/>
+          </a:xfrm>
+          <a:prstGeom prst="rect">
+            <a:avLst/>
+          </a:prstGeom>
+        </p:spPr>
+        <p:txBody>
+          <a:bodyPr vert="horz" lIns="91440" tIns="45720" rIns="91440" bIns="45720" rtlCol="0" anchor="b"/>
+          <a:lstStyle>
+            <a:lvl1pPr algn="r">
+              <a:defRPr sz="1200"/>
+            </a:lvl1pPr>
+          </a:lstStyle>
+          <a:p>
+            <a:fld id="{50770C75-AEEE-4563-8DBD-A5DB571E7DE9}" type="slidenum">
+              <a:rPr lang="fr-CH" smtClean="0"/>
+              <a:t>‹N°›</a:t>
+            </a:fld>
+            <a:endParaRPr lang="fr-CH"/>
+          </a:p>
+        </p:txBody>
+      </p:sp>
+    </p:spTree>
+    <p:extLst>
+      <p:ext uri="{BB962C8B-B14F-4D97-AF65-F5344CB8AC3E}">
+        <p14:creationId xmlns:p14="http://schemas.microsoft.com/office/powerpoint/2010/main" val="4259361484"/>
+      </p:ext>
+    </p:extLst>
+  </p:cSld>
+  <p:clrMap bg1="lt1" tx1="dk1" bg2="lt2" tx2="dk2" accent1="accent1" accent2="accent2" accent3="accent3" accent4="accent4" accent5="accent5" accent6="accent6" hlink="hlink" folHlink="folHlink"/>
+  <p:notesStyle>
+    <a:lvl1pPr marL="0" algn="l" defTabSz="914400" rtl="0" eaLnBrk="1" latinLnBrk="0" hangingPunct="1">
+      <a:defRPr sz="1200" kern="1200">
+        <a:solidFill>
+          <a:schemeClr val="tx1"/>
+        </a:solidFill>
+        <a:latin typeface="+mn-lt"/>
+        <a:ea typeface="+mn-ea"/>
+        <a:cs typeface="+mn-cs"/>
+      </a:defRPr>
+    </a:lvl1pPr>
+    <a:lvl2pPr marL="457200" algn="l" defTabSz="914400" rtl="0" eaLnBrk="1" latinLnBrk="0" hangingPunct="1">
+      <a:defRPr sz="1200" kern="1200">
+        <a:solidFill>
+          <a:schemeClr val="tx1"/>
+        </a:solidFill>
+        <a:latin typeface="+mn-lt"/>
+        <a:ea typeface="+mn-ea"/>
+        <a:cs typeface="+mn-cs"/>
+      </a:defRPr>
+    </a:lvl2pPr>
+    <a:lvl3pPr marL="914400" algn="l" defTabSz="914400" rtl="0" eaLnBrk="1" latinLnBrk="0" hangingPunct="1">
+      <a:defRPr sz="1200" kern="1200">
+        <a:solidFill>
+          <a:schemeClr val="tx1"/>
+        </a:solidFill>
+        <a:latin typeface="+mn-lt"/>
+        <a:ea typeface="+mn-ea"/>
+        <a:cs typeface="+mn-cs"/>
+      </a:defRPr>
+    </a:lvl3pPr>
+    <a:lvl4pPr marL="1371600" algn="l" defTabSz="914400" rtl="0" eaLnBrk="1" latinLnBrk="0" hangingPunct="1">
+      <a:defRPr sz="1200" kern="1200">
+        <a:solidFill>
+          <a:schemeClr val="tx1"/>
+        </a:solidFill>
+        <a:latin typeface="+mn-lt"/>
+        <a:ea typeface="+mn-ea"/>
+        <a:cs typeface="+mn-cs"/>
+      </a:defRPr>
+    </a:lvl4pPr>
+    <a:lvl5pPr marL="1828800" algn="l" defTabSz="914400" rtl="0" eaLnBrk="1" latinLnBrk="0" hangingPunct="1">
+      <a:defRPr sz="1200" kern="1200">
+        <a:solidFill>
+          <a:schemeClr val="tx1"/>
+        </a:solidFill>
+        <a:latin typeface="+mn-lt"/>
+        <a:ea typeface="+mn-ea"/>
+        <a:cs typeface="+mn-cs"/>
+      </a:defRPr>
+    </a:lvl5pPr>
+    <a:lvl6pPr marL="2286000" algn="l" defTabSz="914400" rtl="0" eaLnBrk="1" latinLnBrk="0" hangingPunct="1">
+      <a:defRPr sz="1200" kern="1200">
+        <a:solidFill>
+          <a:schemeClr val="tx1"/>
+        </a:solidFill>
+        <a:latin typeface="+mn-lt"/>
+        <a:ea typeface="+mn-ea"/>
+        <a:cs typeface="+mn-cs"/>
+      </a:defRPr>
+    </a:lvl6pPr>
+    <a:lvl7pPr marL="2743200" algn="l" defTabSz="914400" rtl="0" eaLnBrk="1" latinLnBrk="0" hangingPunct="1">
+      <a:defRPr sz="1200" kern="1200">
+        <a:solidFill>
+          <a:schemeClr val="tx1"/>
+        </a:solidFill>
+        <a:latin typeface="+mn-lt"/>
+        <a:ea typeface="+mn-ea"/>
+        <a:cs typeface="+mn-cs"/>
+      </a:defRPr>
+    </a:lvl7pPr>
+    <a:lvl8pPr marL="3200400" algn="l" defTabSz="914400" rtl="0" eaLnBrk="1" latinLnBrk="0" hangingPunct="1">
+      <a:defRPr sz="1200" kern="1200">
+        <a:solidFill>
+          <a:schemeClr val="tx1"/>
+        </a:solidFill>
+        <a:latin typeface="+mn-lt"/>
+        <a:ea typeface="+mn-ea"/>
+        <a:cs typeface="+mn-cs"/>
+      </a:defRPr>
+    </a:lvl8pPr>
+    <a:lvl9pPr marL="3657600" algn="l" defTabSz="914400" rtl="0" eaLnBrk="1" latinLnBrk="0" hangingPunct="1">
+      <a:defRPr sz="1200" kern="1200">
+        <a:solidFill>
+          <a:schemeClr val="tx1"/>
+        </a:solidFill>
+        <a:latin typeface="+mn-lt"/>
+        <a:ea typeface="+mn-ea"/>
+        <a:cs typeface="+mn-cs"/>
+      </a:defRPr>
+    </a:lvl9pPr>
+  </p:notesStyle>
+</p:notesMaster>
+</file>
+
+<file path=ppt/notesSlides/notesSlide1.xml><?xml version="1.0" encoding="utf-8"?>
+<p:notes xmlns:a="http://schemas.openxmlformats.org/drawingml/2006/main" xmlns:r="http://schemas.openxmlformats.org/officeDocument/2006/relationships" xmlns:p="http://schemas.openxmlformats.org/presentationml/2006/main">
+  <p:cSld>
+    <p:spTree>
+      <p:nvGrpSpPr>
+        <p:cNvPr id="1" name=""/>
+        <p:cNvGrpSpPr/>
+        <p:nvPr/>
+      </p:nvGrpSpPr>
+      <p:grpSpPr>
+        <a:xfrm>
+          <a:off x="0" y="0"/>
+          <a:ext cx="0" cy="0"/>
+          <a:chOff x="0" y="0"/>
+          <a:chExt cx="0" cy="0"/>
+        </a:xfrm>
+      </p:grpSpPr>
+      <p:sp>
+        <p:nvSpPr>
+          <p:cNvPr id="2" name="Espace réservé de l'image des diapositives 1"/>
+          <p:cNvSpPr>
+            <a:spLocks noGrp="1" noRot="1" noChangeAspect="1"/>
+          </p:cNvSpPr>
+          <p:nvPr>
+            <p:ph type="sldImg"/>
+          </p:nvPr>
+        </p:nvSpPr>
+        <p:spPr/>
+      </p:sp>
+      <p:sp>
+        <p:nvSpPr>
+          <p:cNvPr id="3" name="Espace réservé des notes 2"/>
+          <p:cNvSpPr>
+            <a:spLocks noGrp="1"/>
+          </p:cNvSpPr>
+          <p:nvPr>
+            <p:ph type="body" idx="1"/>
+          </p:nvPr>
+        </p:nvSpPr>
+        <p:spPr/>
+        <p:txBody>
+          <a:bodyPr/>
+          <a:lstStyle/>
+          <a:p>
+            <a:endParaRPr lang="fr-CH" dirty="0"/>
+          </a:p>
+        </p:txBody>
+      </p:sp>
+      <p:sp>
+        <p:nvSpPr>
+          <p:cNvPr id="4" name="Espace réservé du numéro de diapositive 3"/>
+          <p:cNvSpPr>
+            <a:spLocks noGrp="1"/>
+          </p:cNvSpPr>
+          <p:nvPr>
+            <p:ph type="sldNum" sz="quarter" idx="5"/>
+          </p:nvPr>
+        </p:nvSpPr>
+        <p:spPr/>
+        <p:txBody>
+          <a:bodyPr/>
+          <a:lstStyle/>
+          <a:p>
+            <a:fld id="{50770C75-AEEE-4563-8DBD-A5DB571E7DE9}" type="slidenum">
+              <a:rPr lang="fr-CH" smtClean="0"/>
+              <a:t>7</a:t>
+            </a:fld>
+            <a:endParaRPr lang="fr-CH"/>
+          </a:p>
+        </p:txBody>
+      </p:sp>
+    </p:spTree>
+    <p:extLst>
+      <p:ext uri="{BB962C8B-B14F-4D97-AF65-F5344CB8AC3E}">
+        <p14:creationId xmlns:p14="http://schemas.microsoft.com/office/powerpoint/2010/main" val="2346644556"/>
+      </p:ext>
+    </p:extLst>
+  </p:cSld>
+  <p:clrMapOvr>
+    <a:masterClrMapping/>
+  </p:clrMapOvr>
+</p:notes>
 </file>
 
 <file path=ppt/slideLayouts/slideLayout1.xml><?xml version="1.0" encoding="utf-8"?>
@@ -634,7 +1072,7 @@
           <a:p>
             <a:fld id="{48A87A34-81AB-432B-8DAE-1953F412C126}" type="datetimeFigureOut">
               <a:rPr lang="en-US" smtClean="0"/>
-              <a:t>1/5/2021</a:t>
+              <a:t>1/10/2021</a:t>
             </a:fld>
             <a:endParaRPr lang="en-US" dirty="0"/>
           </a:p>
@@ -931,7 +1369,7 @@
             <a:fld id="{48A87A34-81AB-432B-8DAE-1953F412C126}" type="datetimeFigureOut">
               <a:rPr lang="en-US" smtClean="0"/>
               <a:pPr/>
-              <a:t>1/5/2021</a:t>
+              <a:t>1/10/2021</a:t>
             </a:fld>
             <a:endParaRPr lang="en-US" dirty="0"/>
           </a:p>
@@ -1181,7 +1619,7 @@
             <a:fld id="{48A87A34-81AB-432B-8DAE-1953F412C126}" type="datetimeFigureOut">
               <a:rPr lang="en-US" smtClean="0"/>
               <a:pPr/>
-              <a:t>1/5/2021</a:t>
+              <a:t>1/10/2021</a:t>
             </a:fld>
             <a:endParaRPr lang="en-US" dirty="0"/>
           </a:p>
@@ -1723,7 +2161,7 @@
             <a:fld id="{48A87A34-81AB-432B-8DAE-1953F412C126}" type="datetimeFigureOut">
               <a:rPr lang="en-US" smtClean="0"/>
               <a:pPr/>
-              <a:t>1/5/2021</a:t>
+              <a:t>1/10/2021</a:t>
             </a:fld>
             <a:endParaRPr lang="en-US" dirty="0"/>
           </a:p>
@@ -1973,7 +2411,7 @@
             <a:fld id="{48A87A34-81AB-432B-8DAE-1953F412C126}" type="datetimeFigureOut">
               <a:rPr lang="en-US" smtClean="0"/>
               <a:pPr/>
-              <a:t>1/5/2021</a:t>
+              <a:t>1/10/2021</a:t>
             </a:fld>
             <a:endParaRPr lang="en-US" dirty="0"/>
           </a:p>
@@ -2507,7 +2945,7 @@
             <a:fld id="{48A87A34-81AB-432B-8DAE-1953F412C126}" type="datetimeFigureOut">
               <a:rPr lang="en-US" smtClean="0"/>
               <a:pPr/>
-              <a:t>1/5/2021</a:t>
+              <a:t>1/10/2021</a:t>
             </a:fld>
             <a:endParaRPr lang="en-US" dirty="0"/>
           </a:p>
@@ -2806,7 +3244,7 @@
             <a:fld id="{48A87A34-81AB-432B-8DAE-1953F412C126}" type="datetimeFigureOut">
               <a:rPr lang="en-US" smtClean="0"/>
               <a:pPr/>
-              <a:t>1/5/2021</a:t>
+              <a:t>1/10/2021</a:t>
             </a:fld>
             <a:endParaRPr lang="en-US" dirty="0"/>
           </a:p>
@@ -2981,7 +3419,7 @@
           <a:p>
             <a:fld id="{48A87A34-81AB-432B-8DAE-1953F412C126}" type="datetimeFigureOut">
               <a:rPr lang="en-US" smtClean="0"/>
-              <a:t>1/5/2021</a:t>
+              <a:t>1/10/2021</a:t>
             </a:fld>
             <a:endParaRPr lang="en-US" dirty="0"/>
           </a:p>
@@ -3161,7 +3599,7 @@
           <a:p>
             <a:fld id="{48A87A34-81AB-432B-8DAE-1953F412C126}" type="datetimeFigureOut">
               <a:rPr lang="en-US" smtClean="0"/>
-              <a:t>1/5/2021</a:t>
+              <a:t>1/10/2021</a:t>
             </a:fld>
             <a:endParaRPr lang="en-US" dirty="0"/>
           </a:p>
@@ -3372,7 +3810,7 @@
           <a:p>
             <a:fld id="{48A87A34-81AB-432B-8DAE-1953F412C126}" type="datetimeFigureOut">
               <a:rPr lang="en-US" smtClean="0"/>
-              <a:t>1/5/2021</a:t>
+              <a:t>1/10/2021</a:t>
             </a:fld>
             <a:endParaRPr lang="en-US" dirty="0"/>
           </a:p>
@@ -3623,7 +4061,7 @@
           <a:p>
             <a:fld id="{48A87A34-81AB-432B-8DAE-1953F412C126}" type="datetimeFigureOut">
               <a:rPr lang="en-US" smtClean="0"/>
-              <a:t>1/5/2021</a:t>
+              <a:t>1/10/2021</a:t>
             </a:fld>
             <a:endParaRPr lang="en-US" dirty="0"/>
           </a:p>
@@ -3970,7 +4408,7 @@
           <a:p>
             <a:fld id="{48A87A34-81AB-432B-8DAE-1953F412C126}" type="datetimeFigureOut">
               <a:rPr lang="en-US" smtClean="0"/>
-              <a:t>1/5/2021</a:t>
+              <a:t>1/10/2021</a:t>
             </a:fld>
             <a:endParaRPr lang="en-US" dirty="0"/>
           </a:p>
@@ -4462,7 +4900,7 @@
           <a:p>
             <a:fld id="{48A87A34-81AB-432B-8DAE-1953F412C126}" type="datetimeFigureOut">
               <a:rPr lang="en-US" smtClean="0"/>
-              <a:t>1/5/2021</a:t>
+              <a:t>1/10/2021</a:t>
             </a:fld>
             <a:endParaRPr lang="en-US" dirty="0"/>
           </a:p>
@@ -4580,7 +5018,7 @@
           <a:p>
             <a:fld id="{48A87A34-81AB-432B-8DAE-1953F412C126}" type="datetimeFigureOut">
               <a:rPr lang="en-US" smtClean="0"/>
-              <a:t>1/5/2021</a:t>
+              <a:t>1/10/2021</a:t>
             </a:fld>
             <a:endParaRPr lang="en-US" dirty="0"/>
           </a:p>
@@ -4675,7 +5113,7 @@
           <a:p>
             <a:fld id="{48A87A34-81AB-432B-8DAE-1953F412C126}" type="datetimeFigureOut">
               <a:rPr lang="en-US" smtClean="0"/>
-              <a:t>1/5/2021</a:t>
+              <a:t>1/10/2021</a:t>
             </a:fld>
             <a:endParaRPr lang="en-US" dirty="0"/>
           </a:p>
@@ -4958,7 +5396,7 @@
           <a:p>
             <a:fld id="{48A87A34-81AB-432B-8DAE-1953F412C126}" type="datetimeFigureOut">
               <a:rPr lang="en-US" smtClean="0"/>
-              <a:t>1/5/2021</a:t>
+              <a:t>1/10/2021</a:t>
             </a:fld>
             <a:endParaRPr lang="en-US" dirty="0"/>
           </a:p>
@@ -5250,7 +5688,7 @@
             <a:fld id="{48A87A34-81AB-432B-8DAE-1953F412C126}" type="datetimeFigureOut">
               <a:rPr lang="en-US" smtClean="0"/>
               <a:pPr/>
-              <a:t>1/5/2021</a:t>
+              <a:t>1/10/2021</a:t>
             </a:fld>
             <a:endParaRPr lang="en-US" dirty="0"/>
           </a:p>
@@ -5781,7 +6219,7 @@
             <a:fld id="{48A87A34-81AB-432B-8DAE-1953F412C126}" type="datetimeFigureOut">
               <a:rPr lang="en-US" smtClean="0"/>
               <a:pPr/>
-              <a:t>1/5/2021</a:t>
+              <a:t>1/10/2021</a:t>
             </a:fld>
             <a:endParaRPr lang="en-US" dirty="0"/>
           </a:p>
@@ -6398,6 +6836,161 @@
 </p:sld>
 </file>
 
+<file path=ppt/slides/slide10.xml><?xml version="1.0" encoding="utf-8"?>
+<p:sld xmlns:a="http://schemas.openxmlformats.org/drawingml/2006/main" xmlns:r="http://schemas.openxmlformats.org/officeDocument/2006/relationships" xmlns:p="http://schemas.openxmlformats.org/presentationml/2006/main">
+  <p:cSld>
+    <p:spTree>
+      <p:nvGrpSpPr>
+        <p:cNvPr id="1" name=""/>
+        <p:cNvGrpSpPr/>
+        <p:nvPr/>
+      </p:nvGrpSpPr>
+      <p:grpSpPr>
+        <a:xfrm>
+          <a:off x="0" y="0"/>
+          <a:ext cx="0" cy="0"/>
+          <a:chOff x="0" y="0"/>
+          <a:chExt cx="0" cy="0"/>
+        </a:xfrm>
+      </p:grpSpPr>
+      <p:sp>
+        <p:nvSpPr>
+          <p:cNvPr id="2" name="Titre 1">
+            <a:extLst>
+              <a:ext uri="{FF2B5EF4-FFF2-40B4-BE49-F238E27FC236}">
+                <a16:creationId xmlns:a16="http://schemas.microsoft.com/office/drawing/2014/main" id="{BDC96AE2-61DA-4041-9BF7-CED69D6ADA66}"/>
+              </a:ext>
+            </a:extLst>
+          </p:cNvPr>
+          <p:cNvSpPr>
+            <a:spLocks noGrp="1"/>
+          </p:cNvSpPr>
+          <p:nvPr>
+            <p:ph type="title"/>
+          </p:nvPr>
+        </p:nvSpPr>
+        <p:spPr/>
+        <p:txBody>
+          <a:bodyPr/>
+          <a:lstStyle/>
+          <a:p>
+            <a:r>
+              <a:rPr lang="fr-FR" dirty="0"/>
+              <a:t>Conclusion</a:t>
+            </a:r>
+            <a:endParaRPr lang="fr-CH" dirty="0"/>
+          </a:p>
+        </p:txBody>
+      </p:sp>
+      <p:sp>
+        <p:nvSpPr>
+          <p:cNvPr id="3" name="Espace réservé du contenu 2">
+            <a:extLst>
+              <a:ext uri="{FF2B5EF4-FFF2-40B4-BE49-F238E27FC236}">
+                <a16:creationId xmlns:a16="http://schemas.microsoft.com/office/drawing/2014/main" id="{E6BBA3A6-F120-4D9A-BA1F-7BD04B86E8CF}"/>
+              </a:ext>
+            </a:extLst>
+          </p:cNvPr>
+          <p:cNvSpPr>
+            <a:spLocks noGrp="1"/>
+          </p:cNvSpPr>
+          <p:nvPr>
+            <p:ph idx="1"/>
+          </p:nvPr>
+        </p:nvSpPr>
+        <p:spPr>
+          <a:xfrm>
+            <a:off x="1484310" y="2438399"/>
+            <a:ext cx="10106007" cy="3641767"/>
+          </a:xfrm>
+        </p:spPr>
+        <p:txBody>
+          <a:bodyPr anchor="t" anchorCtr="0">
+            <a:normAutofit fontScale="92500" lnSpcReduction="10000"/>
+          </a:bodyPr>
+          <a:lstStyle/>
+          <a:p>
+            <a:r>
+              <a:rPr lang="fr-FR" dirty="0"/>
+              <a:t>Projet intéressant permettant de mettre en pratique la théorie expliquée durant les cours.</a:t>
+            </a:r>
+          </a:p>
+          <a:p>
+            <a:r>
+              <a:rPr lang="fr-FR" dirty="0"/>
+              <a:t>On constate qu’il y a plusieurs méthodes pour effectuer certaines opérations, avec des avantages et inconvénients pour chacune. Difficile de choisir la bonne méthode dès le début.</a:t>
+            </a:r>
+          </a:p>
+          <a:p>
+            <a:r>
+              <a:rPr lang="fr-FR" dirty="0"/>
+              <a:t>La mise en place des « </a:t>
+            </a:r>
+            <a:r>
+              <a:rPr lang="fr-FR" dirty="0" err="1"/>
+              <a:t>layout</a:t>
+            </a:r>
+            <a:r>
+              <a:rPr lang="fr-FR" dirty="0"/>
+              <a:t> » demande de la pratique pour bien maîtriser les possibilités (</a:t>
+            </a:r>
+            <a:r>
+              <a:rPr lang="fr-FR" dirty="0" err="1"/>
+              <a:t>Linear</a:t>
+            </a:r>
+            <a:r>
+              <a:rPr lang="fr-FR" dirty="0"/>
+              <a:t>, </a:t>
+            </a:r>
+            <a:r>
+              <a:rPr lang="fr-FR" dirty="0" err="1"/>
+              <a:t>Constraint</a:t>
+            </a:r>
+            <a:r>
+              <a:rPr lang="fr-FR" dirty="0"/>
+              <a:t>,...)</a:t>
+            </a:r>
+          </a:p>
+          <a:p>
+            <a:endParaRPr lang="fr-FR" dirty="0"/>
+          </a:p>
+          <a:p>
+            <a:pPr marL="0" indent="0" algn="ctr">
+              <a:buNone/>
+            </a:pPr>
+            <a:r>
+              <a:rPr lang="fr-FR" dirty="0"/>
+              <a:t>Merci de votre attention et au prochain </a:t>
+            </a:r>
+            <a:r>
+              <a:rPr lang="fr-FR" dirty="0">
+                <a:sym typeface="Wingdings" panose="05000000000000000000" pitchFamily="2" charset="2"/>
+              </a:rPr>
+              <a:t></a:t>
+            </a:r>
+            <a:endParaRPr lang="fr-FR" dirty="0"/>
+          </a:p>
+          <a:p>
+            <a:pPr marL="0" indent="0">
+              <a:buNone/>
+            </a:pPr>
+            <a:endParaRPr lang="fr-CH" sz="2000" dirty="0"/>
+          </a:p>
+        </p:txBody>
+      </p:sp>
+    </p:spTree>
+    <p:extLst>
+      <p:ext uri="{BB962C8B-B14F-4D97-AF65-F5344CB8AC3E}">
+        <p14:creationId xmlns:p14="http://schemas.microsoft.com/office/powerpoint/2010/main" val="2138255372"/>
+      </p:ext>
+    </p:extLst>
+  </p:cSld>
+  <p:clrMapOvr>
+    <a:masterClrMapping/>
+  </p:clrMapOvr>
+</p:sld>
+</file>
+
 <file path=ppt/slides/slide2.xml><?xml version="1.0" encoding="utf-8"?>
 <p:sld xmlns:a="http://schemas.openxmlformats.org/drawingml/2006/main" xmlns:r="http://schemas.openxmlformats.org/officeDocument/2006/relationships" xmlns:p="http://schemas.openxmlformats.org/presentationml/2006/main">
   <p:cSld>
@@ -7341,7 +7934,7 @@
         </p:blipFill>
         <p:spPr>
           <a:xfrm>
-            <a:off x="9855829" y="4135395"/>
+            <a:off x="9913494" y="4827374"/>
             <a:ext cx="2187376" cy="1533180"/>
           </a:xfrm>
           <a:prstGeom prst="rect">
@@ -7702,7 +8295,7 @@
           <p:nvPr/>
         </p:nvPicPr>
         <p:blipFill>
-          <a:blip r:embed="rId2"/>
+          <a:blip r:embed="rId3"/>
           <a:stretch>
             <a:fillRect/>
           </a:stretch>
@@ -7732,7 +8325,7 @@
           <p:nvPr/>
         </p:nvPicPr>
         <p:blipFill>
-          <a:blip r:embed="rId3"/>
+          <a:blip r:embed="rId4"/>
           <a:stretch>
             <a:fillRect/>
           </a:stretch>
@@ -7856,7 +8449,7 @@
           <p:nvPr/>
         </p:nvPicPr>
         <p:blipFill>
-          <a:blip r:embed="rId4"/>
+          <a:blip r:embed="rId5"/>
           <a:stretch>
             <a:fillRect/>
           </a:stretch>
@@ -7949,7 +8542,7 @@
         <p:spPr>
           <a:xfrm>
             <a:off x="1484310" y="2252312"/>
-            <a:ext cx="10018713" cy="3720975"/>
+            <a:ext cx="10018713" cy="4420337"/>
           </a:xfrm>
         </p:spPr>
         <p:txBody>
@@ -8016,6 +8609,17 @@
               <a:rPr lang="fr-FR" dirty="0"/>
               <a:t>							Regex pour validation du format des adresses IP</a:t>
             </a:r>
+            <a:br>
+              <a:rPr lang="fr-FR" dirty="0"/>
+            </a:br>
+            <a:r>
+              <a:rPr lang="fr-FR" dirty="0"/>
+              <a:t>							Toast</a:t>
+            </a:r>
+            <a:br>
+              <a:rPr lang="fr-FR" dirty="0"/>
+            </a:br>
+            <a:endParaRPr lang="fr-FR" dirty="0"/>
           </a:p>
           <a:p>
             <a:pPr lvl="1"/>
@@ -8078,8 +8682,8 @@
           <a:lstStyle/>
           <a:p>
             <a:r>
-              <a:rPr lang="fr-FR" dirty="0"/>
-              <a:t>Conclusion</a:t>
+              <a:rPr lang="fr-FR" dirty="0" err="1"/>
+              <a:t>Demo</a:t>
             </a:r>
             <a:endParaRPr lang="fr-CH" dirty="0"/>
           </a:p>
@@ -8109,57 +8713,14 @@
         </p:spPr>
         <p:txBody>
           <a:bodyPr anchor="t" anchorCtr="0">
-            <a:normAutofit fontScale="92500" lnSpcReduction="10000"/>
+            <a:normAutofit/>
           </a:bodyPr>
           <a:lstStyle/>
           <a:p>
             <a:r>
               <a:rPr lang="fr-FR" dirty="0"/>
-              <a:t>Projet intéressant permettant de mettre en pratique la théorie expliquée durant les cours.</a:t>
-            </a:r>
-          </a:p>
-          <a:p>
-            <a:r>
-              <a:rPr lang="fr-FR" dirty="0"/>
-              <a:t>On constate qu’il y a plusieurs méthodes pour effectuer certaines opérations, avec des avantages et inconvénients pour chacune. Difficile de choisir la bonne méthode dès le début.</a:t>
-            </a:r>
-          </a:p>
-          <a:p>
-            <a:r>
-              <a:rPr lang="fr-FR" dirty="0"/>
-              <a:t>La mise en place des « </a:t>
-            </a:r>
-            <a:r>
-              <a:rPr lang="fr-FR" dirty="0" err="1"/>
-              <a:t>layout</a:t>
-            </a:r>
-            <a:r>
-              <a:rPr lang="fr-FR"/>
-              <a:t> » </a:t>
-            </a:r>
-            <a:r>
-              <a:rPr lang="fr-FR" dirty="0"/>
-              <a:t>demande de la pratique pour bien maîtriser les possibilités</a:t>
-            </a:r>
-          </a:p>
-          <a:p>
-            <a:endParaRPr lang="fr-FR" dirty="0"/>
-          </a:p>
-          <a:p>
-            <a:pPr marL="0" indent="0" algn="ctr">
-              <a:buNone/>
-            </a:pPr>
-            <a:r>
-              <a:rPr lang="fr-FR" dirty="0"/>
-              <a:t>Merci de votre attention et au prochain </a:t>
-            </a:r>
-            <a:r>
-              <a:rPr lang="fr-FR" dirty="0">
-                <a:sym typeface="Wingdings" panose="05000000000000000000" pitchFamily="2" charset="2"/>
-              </a:rPr>
-              <a:t></a:t>
-            </a:r>
-            <a:endParaRPr lang="fr-FR" dirty="0"/>
+              <a:t>Démonstration de l’utilisation de l’application</a:t>
+            </a:r>
           </a:p>
           <a:p>
             <a:pPr marL="0" indent="0">
@@ -8172,7 +8733,7 @@
     </p:spTree>
     <p:extLst>
       <p:ext uri="{BB962C8B-B14F-4D97-AF65-F5344CB8AC3E}">
-        <p14:creationId xmlns:p14="http://schemas.microsoft.com/office/powerpoint/2010/main" val="2138255372"/>
+        <p14:creationId xmlns:p14="http://schemas.microsoft.com/office/powerpoint/2010/main" val="947783576"/>
       </p:ext>
     </p:extLst>
   </p:cSld>
@@ -8436,4 +8997,299 @@
     </a:ext>
   </a:extLst>
 </a:theme>
+</file>
+
+<file path=ppt/theme/theme2.xml><?xml version="1.0" encoding="utf-8"?>
+<a:theme xmlns:a="http://schemas.openxmlformats.org/drawingml/2006/main" name="Thème Office">
+  <a:themeElements>
+    <a:clrScheme name="Office">
+      <a:dk1>
+        <a:sysClr val="windowText" lastClr="000000"/>
+      </a:dk1>
+      <a:lt1>
+        <a:sysClr val="window" lastClr="FFFFFF"/>
+      </a:lt1>
+      <a:dk2>
+        <a:srgbClr val="44546A"/>
+      </a:dk2>
+      <a:lt2>
+        <a:srgbClr val="E7E6E6"/>
+      </a:lt2>
+      <a:accent1>
+        <a:srgbClr val="4472C4"/>
+      </a:accent1>
+      <a:accent2>
+        <a:srgbClr val="ED7D31"/>
+      </a:accent2>
+      <a:accent3>
+        <a:srgbClr val="A5A5A5"/>
+      </a:accent3>
+      <a:accent4>
+        <a:srgbClr val="FFC000"/>
+      </a:accent4>
+      <a:accent5>
+        <a:srgbClr val="5B9BD5"/>
+      </a:accent5>
+      <a:accent6>
+        <a:srgbClr val="70AD47"/>
+      </a:accent6>
+      <a:hlink>
+        <a:srgbClr val="0563C1"/>
+      </a:hlink>
+      <a:folHlink>
+        <a:srgbClr val="954F72"/>
+      </a:folHlink>
+    </a:clrScheme>
+    <a:fontScheme name="Office">
+      <a:majorFont>
+        <a:latin typeface="Calibri Light" panose="020F0302020204030204"/>
+        <a:ea typeface=""/>
+        <a:cs typeface=""/>
+        <a:font script="Jpan" typeface="游ゴシック Light"/>
+        <a:font script="Hang" typeface="맑은 고딕"/>
+        <a:font script="Hans" typeface="等线 Light"/>
+        <a:font script="Hant" typeface="新細明體"/>
+        <a:font script="Arab" typeface="Times New Roman"/>
+        <a:font script="Hebr" typeface="Times New Roman"/>
+        <a:font script="Thai" typeface="Angsana New"/>
+        <a:font script="Ethi" typeface="Nyala"/>
+        <a:font script="Beng" typeface="Vrinda"/>
+        <a:font script="Gujr" typeface="Shruti"/>
+        <a:font script="Khmr" typeface="MoolBoran"/>
+        <a:font script="Knda" typeface="Tunga"/>
+        <a:font script="Guru" typeface="Raavi"/>
+        <a:font script="Cans" typeface="Euphemia"/>
+        <a:font script="Cher" typeface="Plantagenet Cherokee"/>
+        <a:font script="Yiii" typeface="Microsoft Yi Baiti"/>
+        <a:font script="Tibt" typeface="Microsoft Himalaya"/>
+        <a:font script="Thaa" typeface="MV Boli"/>
+        <a:font script="Deva" typeface="Mangal"/>
+        <a:font script="Telu" typeface="Gautami"/>
+        <a:font script="Taml" typeface="Latha"/>
+        <a:font script="Syrc" typeface="Estrangelo Edessa"/>
+        <a:font script="Orya" typeface="Kalinga"/>
+        <a:font script="Mlym" typeface="Kartika"/>
+        <a:font script="Laoo" typeface="DokChampa"/>
+        <a:font script="Sinh" typeface="Iskoola Pota"/>
+        <a:font script="Mong" typeface="Mongolian Baiti"/>
+        <a:font script="Viet" typeface="Times New Roman"/>
+        <a:font script="Uigh" typeface="Microsoft Uighur"/>
+        <a:font script="Geor" typeface="Sylfaen"/>
+        <a:font script="Armn" typeface="Arial"/>
+        <a:font script="Bugi" typeface="Leelawadee UI"/>
+        <a:font script="Bopo" typeface="Microsoft JhengHei"/>
+        <a:font script="Java" typeface="Javanese Text"/>
+        <a:font script="Lisu" typeface="Segoe UI"/>
+        <a:font script="Mymr" typeface="Myanmar Text"/>
+        <a:font script="Nkoo" typeface="Ebrima"/>
+        <a:font script="Olck" typeface="Nirmala UI"/>
+        <a:font script="Osma" typeface="Ebrima"/>
+        <a:font script="Phag" typeface="Phagspa"/>
+        <a:font script="Syrn" typeface="Estrangelo Edessa"/>
+        <a:font script="Syrj" typeface="Estrangelo Edessa"/>
+        <a:font script="Syre" typeface="Estrangelo Edessa"/>
+        <a:font script="Sora" typeface="Nirmala UI"/>
+        <a:font script="Tale" typeface="Microsoft Tai Le"/>
+        <a:font script="Talu" typeface="Microsoft New Tai Lue"/>
+        <a:font script="Tfng" typeface="Ebrima"/>
+      </a:majorFont>
+      <a:minorFont>
+        <a:latin typeface="Calibri" panose="020F0502020204030204"/>
+        <a:ea typeface=""/>
+        <a:cs typeface=""/>
+        <a:font script="Jpan" typeface="游ゴシック"/>
+        <a:font script="Hang" typeface="맑은 고딕"/>
+        <a:font script="Hans" typeface="等线"/>
+        <a:font script="Hant" typeface="新細明體"/>
+        <a:font script="Arab" typeface="Arial"/>
+        <a:font script="Hebr" typeface="Arial"/>
+        <a:font script="Thai" typeface="Cordia New"/>
+        <a:font script="Ethi" typeface="Nyala"/>
+        <a:font script="Beng" typeface="Vrinda"/>
+        <a:font script="Gujr" typeface="Shruti"/>
+        <a:font script="Khmr" typeface="DaunPenh"/>
+        <a:font script="Knda" typeface="Tunga"/>
+        <a:font script="Guru" typeface="Raavi"/>
+        <a:font script="Cans" typeface="Euphemia"/>
+        <a:font script="Cher" typeface="Plantagenet Cherokee"/>
+        <a:font script="Yiii" typeface="Microsoft Yi Baiti"/>
+        <a:font script="Tibt" typeface="Microsoft Himalaya"/>
+        <a:font script="Thaa" typeface="MV Boli"/>
+        <a:font script="Deva" typeface="Mangal"/>
+        <a:font script="Telu" typeface="Gautami"/>
+        <a:font script="Taml" typeface="Latha"/>
+        <a:font script="Syrc" typeface="Estrangelo Edessa"/>
+        <a:font script="Orya" typeface="Kalinga"/>
+        <a:font script="Mlym" typeface="Kartika"/>
+        <a:font script="Laoo" typeface="DokChampa"/>
+        <a:font script="Sinh" typeface="Iskoola Pota"/>
+        <a:font script="Mong" typeface="Mongolian Baiti"/>
+        <a:font script="Viet" typeface="Arial"/>
+        <a:font script="Uigh" typeface="Microsoft Uighur"/>
+        <a:font script="Geor" typeface="Sylfaen"/>
+        <a:font script="Armn" typeface="Arial"/>
+        <a:font script="Bugi" typeface="Leelawadee UI"/>
+        <a:font script="Bopo" typeface="Microsoft JhengHei"/>
+        <a:font script="Java" typeface="Javanese Text"/>
+        <a:font script="Lisu" typeface="Segoe UI"/>
+        <a:font script="Mymr" typeface="Myanmar Text"/>
+        <a:font script="Nkoo" typeface="Ebrima"/>
+        <a:font script="Olck" typeface="Nirmala UI"/>
+        <a:font script="Osma" typeface="Ebrima"/>
+        <a:font script="Phag" typeface="Phagspa"/>
+        <a:font script="Syrn" typeface="Estrangelo Edessa"/>
+        <a:font script="Syrj" typeface="Estrangelo Edessa"/>
+        <a:font script="Syre" typeface="Estrangelo Edessa"/>
+        <a:font script="Sora" typeface="Nirmala UI"/>
+        <a:font script="Tale" typeface="Microsoft Tai Le"/>
+        <a:font script="Talu" typeface="Microsoft New Tai Lue"/>
+        <a:font script="Tfng" typeface="Ebrima"/>
+      </a:minorFont>
+    </a:fontScheme>
+    <a:fmtScheme name="Office">
+      <a:fillStyleLst>
+        <a:solidFill>
+          <a:schemeClr val="phClr"/>
+        </a:solidFill>
+        <a:gradFill rotWithShape="1">
+          <a:gsLst>
+            <a:gs pos="0">
+              <a:schemeClr val="phClr">
+                <a:lumMod val="110000"/>
+                <a:satMod val="105000"/>
+                <a:tint val="67000"/>
+              </a:schemeClr>
+            </a:gs>
+            <a:gs pos="50000">
+              <a:schemeClr val="phClr">
+                <a:lumMod val="105000"/>
+                <a:satMod val="103000"/>
+                <a:tint val="73000"/>
+              </a:schemeClr>
+            </a:gs>
+            <a:gs pos="100000">
+              <a:schemeClr val="phClr">
+                <a:lumMod val="105000"/>
+                <a:satMod val="109000"/>
+                <a:tint val="81000"/>
+              </a:schemeClr>
+            </a:gs>
+          </a:gsLst>
+          <a:lin ang="5400000" scaled="0"/>
+        </a:gradFill>
+        <a:gradFill rotWithShape="1">
+          <a:gsLst>
+            <a:gs pos="0">
+              <a:schemeClr val="phClr">
+                <a:satMod val="103000"/>
+                <a:lumMod val="102000"/>
+                <a:tint val="94000"/>
+              </a:schemeClr>
+            </a:gs>
+            <a:gs pos="50000">
+              <a:schemeClr val="phClr">
+                <a:satMod val="110000"/>
+                <a:lumMod val="100000"/>
+                <a:shade val="100000"/>
+              </a:schemeClr>
+            </a:gs>
+            <a:gs pos="100000">
+              <a:schemeClr val="phClr">
+                <a:lumMod val="99000"/>
+                <a:satMod val="120000"/>
+                <a:shade val="78000"/>
+              </a:schemeClr>
+            </a:gs>
+          </a:gsLst>
+          <a:lin ang="5400000" scaled="0"/>
+        </a:gradFill>
+      </a:fillStyleLst>
+      <a:lnStyleLst>
+        <a:ln w="6350" cap="flat" cmpd="sng" algn="ctr">
+          <a:solidFill>
+            <a:schemeClr val="phClr"/>
+          </a:solidFill>
+          <a:prstDash val="solid"/>
+          <a:miter lim="800000"/>
+        </a:ln>
+        <a:ln w="12700" cap="flat" cmpd="sng" algn="ctr">
+          <a:solidFill>
+            <a:schemeClr val="phClr"/>
+          </a:solidFill>
+          <a:prstDash val="solid"/>
+          <a:miter lim="800000"/>
+        </a:ln>
+        <a:ln w="19050" cap="flat" cmpd="sng" algn="ctr">
+          <a:solidFill>
+            <a:schemeClr val="phClr"/>
+          </a:solidFill>
+          <a:prstDash val="solid"/>
+          <a:miter lim="800000"/>
+        </a:ln>
+      </a:lnStyleLst>
+      <a:effectStyleLst>
+        <a:effectStyle>
+          <a:effectLst/>
+        </a:effectStyle>
+        <a:effectStyle>
+          <a:effectLst/>
+        </a:effectStyle>
+        <a:effectStyle>
+          <a:effectLst>
+            <a:outerShdw blurRad="57150" dist="19050" dir="5400000" algn="ctr" rotWithShape="0">
+              <a:srgbClr val="000000">
+                <a:alpha val="63000"/>
+              </a:srgbClr>
+            </a:outerShdw>
+          </a:effectLst>
+        </a:effectStyle>
+      </a:effectStyleLst>
+      <a:bgFillStyleLst>
+        <a:solidFill>
+          <a:schemeClr val="phClr"/>
+        </a:solidFill>
+        <a:solidFill>
+          <a:schemeClr val="phClr">
+            <a:tint val="95000"/>
+            <a:satMod val="170000"/>
+          </a:schemeClr>
+        </a:solidFill>
+        <a:gradFill rotWithShape="1">
+          <a:gsLst>
+            <a:gs pos="0">
+              <a:schemeClr val="phClr">
+                <a:tint val="93000"/>
+                <a:satMod val="150000"/>
+                <a:shade val="98000"/>
+                <a:lumMod val="102000"/>
+              </a:schemeClr>
+            </a:gs>
+            <a:gs pos="50000">
+              <a:schemeClr val="phClr">
+                <a:tint val="98000"/>
+                <a:satMod val="130000"/>
+                <a:shade val="90000"/>
+                <a:lumMod val="103000"/>
+              </a:schemeClr>
+            </a:gs>
+            <a:gs pos="100000">
+              <a:schemeClr val="phClr">
+                <a:shade val="63000"/>
+                <a:satMod val="120000"/>
+              </a:schemeClr>
+            </a:gs>
+          </a:gsLst>
+          <a:lin ang="5400000" scaled="0"/>
+        </a:gradFill>
+      </a:bgFillStyleLst>
+    </a:fmtScheme>
+  </a:themeElements>
+  <a:objectDefaults/>
+  <a:extraClrSchemeLst/>
+  <a:extLst>
+    <a:ext uri="{05A4C25C-085E-4340-85A3-A5531E510DB2}">
+      <thm15:themeFamily xmlns:thm15="http://schemas.microsoft.com/office/thememl/2012/main" name="Office Theme" id="{62F939B6-93AF-4DB8-9C6B-D6C7DFDC589F}" vid="{4A3C46E8-61CC-4603-A589-7422A47A8E4A}"/>
+    </a:ext>
+  </a:extLst>
+</a:theme>
 </file>
</xml_diff>